<commit_message>
Back to a working version
</commit_message>
<xml_diff>
--- a/triangulation_panel/Triangulation Presentation.pptx
+++ b/triangulation_panel/Triangulation Presentation.pptx
@@ -141,7 +141,7 @@
   <pc:docChgLst>
     <pc:chgData name="Luke McGuinness" userId="e112a522-4621-4996-b019-4df276cba636" providerId="ADAL" clId="{CA77D002-C233-495E-ACDB-074849D8B324}"/>
     <pc:docChg chg="undo custSel addSld modSld">
-      <pc:chgData name="Luke McGuinness" userId="e112a522-4621-4996-b019-4df276cba636" providerId="ADAL" clId="{CA77D002-C233-495E-ACDB-074849D8B324}" dt="2021-09-20T11:04:11.169" v="480" actId="20577"/>
+      <pc:chgData name="Luke McGuinness" userId="e112a522-4621-4996-b019-4df276cba636" providerId="ADAL" clId="{CA77D002-C233-495E-ACDB-074849D8B324}" dt="2021-09-21T12:13:14.387" v="514" actId="20577"/>
       <pc:docMkLst>
         <pc:docMk/>
       </pc:docMkLst>
@@ -270,7 +270,7 @@
         </pc:picChg>
       </pc:sldChg>
       <pc:sldChg chg="addSp delSp modSp new mod">
-        <pc:chgData name="Luke McGuinness" userId="e112a522-4621-4996-b019-4df276cba636" providerId="ADAL" clId="{CA77D002-C233-495E-ACDB-074849D8B324}" dt="2021-09-20T11:01:54.127" v="267" actId="20577"/>
+        <pc:chgData name="Luke McGuinness" userId="e112a522-4621-4996-b019-4df276cba636" providerId="ADAL" clId="{CA77D002-C233-495E-ACDB-074849D8B324}" dt="2021-09-21T12:13:14.387" v="514" actId="20577"/>
         <pc:sldMkLst>
           <pc:docMk/>
           <pc:sldMk cId="897798445" sldId="260"/>
@@ -284,7 +284,7 @@
           </ac:spMkLst>
         </pc:spChg>
         <pc:spChg chg="add del mod">
-          <ac:chgData name="Luke McGuinness" userId="e112a522-4621-4996-b019-4df276cba636" providerId="ADAL" clId="{CA77D002-C233-495E-ACDB-074849D8B324}" dt="2021-09-20T11:01:44.159" v="241" actId="20577"/>
+          <ac:chgData name="Luke McGuinness" userId="e112a522-4621-4996-b019-4df276cba636" providerId="ADAL" clId="{CA77D002-C233-495E-ACDB-074849D8B324}" dt="2021-09-21T12:13:14.387" v="514" actId="20577"/>
           <ac:spMkLst>
             <pc:docMk/>
             <pc:sldMk cId="897798445" sldId="260"/>
@@ -316,7 +316,7 @@
           </ac:picMkLst>
         </pc:picChg>
         <pc:picChg chg="add mod modCrop">
-          <ac:chgData name="Luke McGuinness" userId="e112a522-4621-4996-b019-4df276cba636" providerId="ADAL" clId="{CA77D002-C233-495E-ACDB-074849D8B324}" dt="2021-09-20T11:01:06.578" v="210" actId="1076"/>
+          <ac:chgData name="Luke McGuinness" userId="e112a522-4621-4996-b019-4df276cba636" providerId="ADAL" clId="{CA77D002-C233-495E-ACDB-074849D8B324}" dt="2021-09-21T12:13:08.451" v="498" actId="1038"/>
           <ac:picMkLst>
             <pc:docMk/>
             <pc:sldMk cId="897798445" sldId="260"/>
@@ -501,7 +501,7 @@
           <a:p>
             <a:fld id="{BF0DDC31-7854-46A5-A67A-4B5F000B6CDE}" type="datetimeFigureOut">
               <a:rPr lang="en-GB" smtClean="0"/>
-              <a:t>20/09/2021</a:t>
+              <a:t>21/09/2021</a:t>
             </a:fld>
             <a:endParaRPr lang="en-GB"/>
           </a:p>
@@ -701,7 +701,7 @@
           <a:p>
             <a:fld id="{BF0DDC31-7854-46A5-A67A-4B5F000B6CDE}" type="datetimeFigureOut">
               <a:rPr lang="en-GB" smtClean="0"/>
-              <a:t>20/09/2021</a:t>
+              <a:t>21/09/2021</a:t>
             </a:fld>
             <a:endParaRPr lang="en-GB"/>
           </a:p>
@@ -911,7 +911,7 @@
           <a:p>
             <a:fld id="{BF0DDC31-7854-46A5-A67A-4B5F000B6CDE}" type="datetimeFigureOut">
               <a:rPr lang="en-GB" smtClean="0"/>
-              <a:t>20/09/2021</a:t>
+              <a:t>21/09/2021</a:t>
             </a:fld>
             <a:endParaRPr lang="en-GB"/>
           </a:p>
@@ -1111,7 +1111,7 @@
           <a:p>
             <a:fld id="{BF0DDC31-7854-46A5-A67A-4B5F000B6CDE}" type="datetimeFigureOut">
               <a:rPr lang="en-GB" smtClean="0"/>
-              <a:t>20/09/2021</a:t>
+              <a:t>21/09/2021</a:t>
             </a:fld>
             <a:endParaRPr lang="en-GB"/>
           </a:p>
@@ -1387,7 +1387,7 @@
           <a:p>
             <a:fld id="{BF0DDC31-7854-46A5-A67A-4B5F000B6CDE}" type="datetimeFigureOut">
               <a:rPr lang="en-GB" smtClean="0"/>
-              <a:t>20/09/2021</a:t>
+              <a:t>21/09/2021</a:t>
             </a:fld>
             <a:endParaRPr lang="en-GB"/>
           </a:p>
@@ -1655,7 +1655,7 @@
           <a:p>
             <a:fld id="{BF0DDC31-7854-46A5-A67A-4B5F000B6CDE}" type="datetimeFigureOut">
               <a:rPr lang="en-GB" smtClean="0"/>
-              <a:t>20/09/2021</a:t>
+              <a:t>21/09/2021</a:t>
             </a:fld>
             <a:endParaRPr lang="en-GB"/>
           </a:p>
@@ -2070,7 +2070,7 @@
           <a:p>
             <a:fld id="{BF0DDC31-7854-46A5-A67A-4B5F000B6CDE}" type="datetimeFigureOut">
               <a:rPr lang="en-GB" smtClean="0"/>
-              <a:t>20/09/2021</a:t>
+              <a:t>21/09/2021</a:t>
             </a:fld>
             <a:endParaRPr lang="en-GB"/>
           </a:p>
@@ -2212,7 +2212,7 @@
           <a:p>
             <a:fld id="{BF0DDC31-7854-46A5-A67A-4B5F000B6CDE}" type="datetimeFigureOut">
               <a:rPr lang="en-GB" smtClean="0"/>
-              <a:t>20/09/2021</a:t>
+              <a:t>21/09/2021</a:t>
             </a:fld>
             <a:endParaRPr lang="en-GB"/>
           </a:p>
@@ -2325,7 +2325,7 @@
           <a:p>
             <a:fld id="{BF0DDC31-7854-46A5-A67A-4B5F000B6CDE}" type="datetimeFigureOut">
               <a:rPr lang="en-GB" smtClean="0"/>
-              <a:t>20/09/2021</a:t>
+              <a:t>21/09/2021</a:t>
             </a:fld>
             <a:endParaRPr lang="en-GB"/>
           </a:p>
@@ -2638,7 +2638,7 @@
           <a:p>
             <a:fld id="{BF0DDC31-7854-46A5-A67A-4B5F000B6CDE}" type="datetimeFigureOut">
               <a:rPr lang="en-GB" smtClean="0"/>
-              <a:t>20/09/2021</a:t>
+              <a:t>21/09/2021</a:t>
             </a:fld>
             <a:endParaRPr lang="en-GB"/>
           </a:p>
@@ -2927,7 +2927,7 @@
           <a:p>
             <a:fld id="{BF0DDC31-7854-46A5-A67A-4B5F000B6CDE}" type="datetimeFigureOut">
               <a:rPr lang="en-GB" smtClean="0"/>
-              <a:t>20/09/2021</a:t>
+              <a:t>21/09/2021</a:t>
             </a:fld>
             <a:endParaRPr lang="en-GB"/>
           </a:p>
@@ -3170,7 +3170,7 @@
           <a:p>
             <a:fld id="{BF0DDC31-7854-46A5-A67A-4B5F000B6CDE}" type="datetimeFigureOut">
               <a:rPr lang="en-GB" smtClean="0"/>
-              <a:t>20/09/2021</a:t>
+              <a:t>21/09/2021</a:t>
             </a:fld>
             <a:endParaRPr lang="en-GB"/>
           </a:p>
@@ -3759,8 +3759,13 @@
           <a:p>
             <a:r>
               <a:rPr lang="en-GB" dirty="0"/>
-              <a:t>Analysis of lipids levels across three previously unanalysed cohorts, obtained via the DPUK</a:t>
-            </a:r>
+              <a:t>Analysis of lipids levels across three previously unanalysed cohorts, obtained via the </a:t>
+            </a:r>
+            <a:r>
+              <a:rPr lang="en-GB"/>
+              <a:t>Dementia Platform UK</a:t>
+            </a:r>
+            <a:endParaRPr lang="en-GB" dirty="0"/>
           </a:p>
           <a:p>
             <a:pPr marL="0" indent="0">
@@ -3797,7 +3802,7 @@
         </p:blipFill>
         <p:spPr>
           <a:xfrm>
-            <a:off x="7253288" y="1690688"/>
+            <a:off x="7601634" y="1690688"/>
             <a:ext cx="4100512" cy="3664014"/>
           </a:xfrm>
           <a:prstGeom prst="rect">

</xml_diff>